<commit_message>
array methods and comparison
</commit_message>
<xml_diff>
--- a/xx/lecture2/javascript/javascript.pptx
+++ b/xx/lecture2/javascript/javascript.pptx
@@ -23,6 +23,8 @@
     <p:sldId id="271" r:id="rId17"/>
     <p:sldId id="272" r:id="rId18"/>
     <p:sldId id="273" r:id="rId19"/>
+    <p:sldId id="274" r:id="rId20"/>
+    <p:sldId id="275" r:id="rId21"/>
   </p:sldIdLst>
   <p:sldSz cx="12192000" cy="6858000"/>
   <p:notesSz cx="6858000" cy="9144000"/>
@@ -260,7 +262,7 @@
           <a:p>
             <a:fld id="{4C6BD7AD-248A-4614-9D7C-8273F8421C86}" type="datetimeFigureOut">
               <a:rPr lang="en-US" smtClean="0"/>
-              <a:t>10/6/2023</a:t>
+              <a:t>10/11/2023</a:t>
             </a:fld>
             <a:endParaRPr lang="en-US"/>
           </a:p>
@@ -430,7 +432,7 @@
           <a:p>
             <a:fld id="{4C6BD7AD-248A-4614-9D7C-8273F8421C86}" type="datetimeFigureOut">
               <a:rPr lang="en-US" smtClean="0"/>
-              <a:t>10/6/2023</a:t>
+              <a:t>10/11/2023</a:t>
             </a:fld>
             <a:endParaRPr lang="en-US"/>
           </a:p>
@@ -610,7 +612,7 @@
           <a:p>
             <a:fld id="{4C6BD7AD-248A-4614-9D7C-8273F8421C86}" type="datetimeFigureOut">
               <a:rPr lang="en-US" smtClean="0"/>
-              <a:t>10/6/2023</a:t>
+              <a:t>10/11/2023</a:t>
             </a:fld>
             <a:endParaRPr lang="en-US"/>
           </a:p>
@@ -780,7 +782,7 @@
           <a:p>
             <a:fld id="{4C6BD7AD-248A-4614-9D7C-8273F8421C86}" type="datetimeFigureOut">
               <a:rPr lang="en-US" smtClean="0"/>
-              <a:t>10/6/2023</a:t>
+              <a:t>10/11/2023</a:t>
             </a:fld>
             <a:endParaRPr lang="en-US"/>
           </a:p>
@@ -1026,7 +1028,7 @@
           <a:p>
             <a:fld id="{4C6BD7AD-248A-4614-9D7C-8273F8421C86}" type="datetimeFigureOut">
               <a:rPr lang="en-US" smtClean="0"/>
-              <a:t>10/6/2023</a:t>
+              <a:t>10/11/2023</a:t>
             </a:fld>
             <a:endParaRPr lang="en-US"/>
           </a:p>
@@ -1258,7 +1260,7 @@
           <a:p>
             <a:fld id="{4C6BD7AD-248A-4614-9D7C-8273F8421C86}" type="datetimeFigureOut">
               <a:rPr lang="en-US" smtClean="0"/>
-              <a:t>10/6/2023</a:t>
+              <a:t>10/11/2023</a:t>
             </a:fld>
             <a:endParaRPr lang="en-US"/>
           </a:p>
@@ -1625,7 +1627,7 @@
           <a:p>
             <a:fld id="{4C6BD7AD-248A-4614-9D7C-8273F8421C86}" type="datetimeFigureOut">
               <a:rPr lang="en-US" smtClean="0"/>
-              <a:t>10/6/2023</a:t>
+              <a:t>10/11/2023</a:t>
             </a:fld>
             <a:endParaRPr lang="en-US"/>
           </a:p>
@@ -1743,7 +1745,7 @@
           <a:p>
             <a:fld id="{4C6BD7AD-248A-4614-9D7C-8273F8421C86}" type="datetimeFigureOut">
               <a:rPr lang="en-US" smtClean="0"/>
-              <a:t>10/6/2023</a:t>
+              <a:t>10/11/2023</a:t>
             </a:fld>
             <a:endParaRPr lang="en-US"/>
           </a:p>
@@ -1838,7 +1840,7 @@
           <a:p>
             <a:fld id="{4C6BD7AD-248A-4614-9D7C-8273F8421C86}" type="datetimeFigureOut">
               <a:rPr lang="en-US" smtClean="0"/>
-              <a:t>10/6/2023</a:t>
+              <a:t>10/11/2023</a:t>
             </a:fld>
             <a:endParaRPr lang="en-US"/>
           </a:p>
@@ -2115,7 +2117,7 @@
           <a:p>
             <a:fld id="{4C6BD7AD-248A-4614-9D7C-8273F8421C86}" type="datetimeFigureOut">
               <a:rPr lang="en-US" smtClean="0"/>
-              <a:t>10/6/2023</a:t>
+              <a:t>10/11/2023</a:t>
             </a:fld>
             <a:endParaRPr lang="en-US"/>
           </a:p>
@@ -2368,7 +2370,7 @@
           <a:p>
             <a:fld id="{4C6BD7AD-248A-4614-9D7C-8273F8421C86}" type="datetimeFigureOut">
               <a:rPr lang="en-US" smtClean="0"/>
-              <a:t>10/6/2023</a:t>
+              <a:t>10/11/2023</a:t>
             </a:fld>
             <a:endParaRPr lang="en-US"/>
           </a:p>
@@ -2581,7 +2583,7 @@
           <a:p>
             <a:fld id="{4C6BD7AD-248A-4614-9D7C-8273F8421C86}" type="datetimeFigureOut">
               <a:rPr lang="en-US" smtClean="0"/>
-              <a:t>10/6/2023</a:t>
+              <a:t>10/11/2023</a:t>
             </a:fld>
             <a:endParaRPr lang="en-US"/>
           </a:p>
@@ -5065,6 +5067,975 @@
 </p:sld>
 </file>
 
+<file path=ppt/slides/slide19.xml><?xml version="1.0" encoding="utf-8"?>
+<p:sld xmlns:a="http://schemas.openxmlformats.org/drawingml/2006/main" xmlns:r="http://schemas.openxmlformats.org/officeDocument/2006/relationships" xmlns:p="http://schemas.openxmlformats.org/presentationml/2006/main">
+  <p:cSld>
+    <p:spTree>
+      <p:nvGrpSpPr>
+        <p:cNvPr id="1" name=""/>
+        <p:cNvGrpSpPr/>
+        <p:nvPr/>
+      </p:nvGrpSpPr>
+      <p:grpSpPr>
+        <a:xfrm>
+          <a:off x="0" y="0"/>
+          <a:ext cx="0" cy="0"/>
+          <a:chOff x="0" y="0"/>
+          <a:chExt cx="0" cy="0"/>
+        </a:xfrm>
+      </p:grpSpPr>
+      <p:sp>
+        <p:nvSpPr>
+          <p:cNvPr id="3" name="Content Placeholder 2"/>
+          <p:cNvSpPr>
+            <a:spLocks noGrp="1"/>
+          </p:cNvSpPr>
+          <p:nvPr>
+            <p:ph idx="1"/>
+          </p:nvPr>
+        </p:nvSpPr>
+        <p:spPr>
+          <a:xfrm>
+            <a:off x="838199" y="429491"/>
+            <a:ext cx="10735849" cy="6322038"/>
+          </a:xfrm>
+        </p:spPr>
+        <p:txBody>
+          <a:bodyPr/>
+          <a:lstStyle/>
+          <a:p>
+            <a:pPr marL="0" indent="0">
+              <a:buNone/>
+            </a:pPr>
+            <a:r>
+              <a:rPr lang="en-US" b="1" dirty="0" smtClean="0"/>
+              <a:t>Comparison Operators</a:t>
+            </a:r>
+          </a:p>
+          <a:p>
+            <a:pPr marL="0" indent="0">
+              <a:buNone/>
+            </a:pPr>
+            <a:r>
+              <a:rPr lang="en-US" sz="2400" dirty="0"/>
+              <a:t>Comparison operators are used </a:t>
+            </a:r>
+            <a:r>
+              <a:rPr lang="en-US" sz="2400" dirty="0" smtClean="0"/>
+              <a:t>determine if a logical </a:t>
+            </a:r>
+            <a:r>
+              <a:rPr lang="en-US" sz="2400" dirty="0" smtClean="0"/>
+              <a:t>statement </a:t>
+            </a:r>
+            <a:r>
+              <a:rPr lang="en-US" sz="2400" dirty="0" smtClean="0"/>
+              <a:t>satisfies a condition.</a:t>
+            </a:r>
+          </a:p>
+          <a:p>
+            <a:pPr marL="0" indent="0">
+              <a:buNone/>
+            </a:pPr>
+            <a:r>
+              <a:rPr lang="en-US" sz="2400" i="1" dirty="0"/>
+              <a:t>l</a:t>
+            </a:r>
+            <a:r>
+              <a:rPr lang="en-US" sz="2400" i="1" dirty="0" smtClean="0"/>
+              <a:t>et x = 10;</a:t>
+            </a:r>
+          </a:p>
+          <a:p>
+            <a:pPr marL="0" indent="0">
+              <a:buNone/>
+            </a:pPr>
+            <a:endParaRPr lang="en-US" dirty="0" smtClean="0"/>
+          </a:p>
+          <a:p>
+            <a:pPr marL="0" indent="0">
+              <a:buNone/>
+            </a:pPr>
+            <a:endParaRPr lang="en-US" dirty="0" smtClean="0"/>
+          </a:p>
+          <a:p>
+            <a:pPr marL="0" indent="0">
+              <a:buNone/>
+            </a:pPr>
+            <a:endParaRPr lang="en-US" dirty="0"/>
+          </a:p>
+          <a:p>
+            <a:pPr marL="0" indent="0">
+              <a:buNone/>
+            </a:pPr>
+            <a:endParaRPr lang="en-US" dirty="0" smtClean="0"/>
+          </a:p>
+          <a:p>
+            <a:pPr marL="0" indent="0">
+              <a:buNone/>
+            </a:pPr>
+            <a:endParaRPr lang="en-US" dirty="0"/>
+          </a:p>
+          <a:p>
+            <a:pPr marL="0" indent="0">
+              <a:buNone/>
+            </a:pPr>
+            <a:endParaRPr lang="en-US" dirty="0" smtClean="0"/>
+          </a:p>
+          <a:p>
+            <a:pPr marL="0" indent="0">
+              <a:buNone/>
+            </a:pPr>
+            <a:endParaRPr lang="en-US" dirty="0" smtClean="0"/>
+          </a:p>
+          <a:p>
+            <a:pPr marL="0" indent="0">
+              <a:buNone/>
+            </a:pPr>
+            <a:endParaRPr lang="en-US" dirty="0"/>
+          </a:p>
+        </p:txBody>
+      </p:sp>
+      <p:graphicFrame>
+        <p:nvGraphicFramePr>
+          <p:cNvPr id="5" name="Table 4"/>
+          <p:cNvGraphicFramePr>
+            <a:graphicFrameLocks noGrp="1"/>
+          </p:cNvGraphicFramePr>
+          <p:nvPr>
+            <p:extLst>
+              <p:ext uri="{D42A27DB-BD31-4B8C-83A1-F6EECF244321}">
+                <p14:modId xmlns:p14="http://schemas.microsoft.com/office/powerpoint/2010/main" val="50660311"/>
+              </p:ext>
+            </p:extLst>
+          </p:nvPr>
+        </p:nvGraphicFramePr>
+        <p:xfrm>
+          <a:off x="979054" y="2398987"/>
+          <a:ext cx="9882910" cy="1828800"/>
+        </p:xfrm>
+        <a:graphic>
+          <a:graphicData uri="http://schemas.openxmlformats.org/drawingml/2006/table">
+            <a:tbl>
+              <a:tblPr firstRow="1" bandRow="1">
+                <a:tableStyleId>{F5AB1C69-6EDB-4FF4-983F-18BD219EF322}</a:tableStyleId>
+              </a:tblPr>
+              <a:tblGrid>
+                <a:gridCol w="2246117">
+                  <a:extLst>
+                    <a:ext uri="{9D8B030D-6E8A-4147-A177-3AD203B41FA5}">
+                      <a16:colId xmlns:a16="http://schemas.microsoft.com/office/drawing/2014/main" val="880254515"/>
+                    </a:ext>
+                  </a:extLst>
+                </a:gridCol>
+                <a:gridCol w="4177776">
+                  <a:extLst>
+                    <a:ext uri="{9D8B030D-6E8A-4147-A177-3AD203B41FA5}">
+                      <a16:colId xmlns:a16="http://schemas.microsoft.com/office/drawing/2014/main" val="3713784638"/>
+                    </a:ext>
+                  </a:extLst>
+                </a:gridCol>
+                <a:gridCol w="3459017">
+                  <a:extLst>
+                    <a:ext uri="{9D8B030D-6E8A-4147-A177-3AD203B41FA5}">
+                      <a16:colId xmlns:a16="http://schemas.microsoft.com/office/drawing/2014/main" val="1522730688"/>
+                    </a:ext>
+                  </a:extLst>
+                </a:gridCol>
+              </a:tblGrid>
+              <a:tr h="359426">
+                <a:tc>
+                  <a:txBody>
+                    <a:bodyPr/>
+                    <a:lstStyle/>
+                    <a:p>
+                      <a:r>
+                        <a:rPr lang="en-US" dirty="0" smtClean="0"/>
+                        <a:t>Operator</a:t>
+                      </a:r>
+                      <a:endParaRPr lang="en-US" dirty="0"/>
+                    </a:p>
+                  </a:txBody>
+                  <a:tcPr/>
+                </a:tc>
+                <a:tc>
+                  <a:txBody>
+                    <a:bodyPr/>
+                    <a:lstStyle/>
+                    <a:p>
+                      <a:r>
+                        <a:rPr lang="en-US" dirty="0" smtClean="0"/>
+                        <a:t>Description</a:t>
+                      </a:r>
+                      <a:endParaRPr lang="en-US" dirty="0"/>
+                    </a:p>
+                  </a:txBody>
+                  <a:tcPr/>
+                </a:tc>
+                <a:tc>
+                  <a:txBody>
+                    <a:bodyPr/>
+                    <a:lstStyle/>
+                    <a:p>
+                      <a:r>
+                        <a:rPr lang="en-US" dirty="0" smtClean="0"/>
+                        <a:t>Use</a:t>
+                      </a:r>
+                      <a:r>
+                        <a:rPr lang="en-US" baseline="0" dirty="0" smtClean="0"/>
+                        <a:t> Case</a:t>
+                      </a:r>
+                      <a:endParaRPr lang="en-US" dirty="0"/>
+                    </a:p>
+                  </a:txBody>
+                  <a:tcPr/>
+                </a:tc>
+                <a:extLst>
+                  <a:ext uri="{0D108BD9-81ED-4DB2-BD59-A6C34878D82A}">
+                    <a16:rowId xmlns:a16="http://schemas.microsoft.com/office/drawing/2014/main" val="1844749145"/>
+                  </a:ext>
+                </a:extLst>
+              </a:tr>
+              <a:tr h="364418">
+                <a:tc>
+                  <a:txBody>
+                    <a:bodyPr/>
+                    <a:lstStyle/>
+                    <a:p>
+                      <a:r>
+                        <a:rPr lang="en-US" dirty="0" smtClean="0"/>
+                        <a:t>==</a:t>
+                      </a:r>
+                      <a:endParaRPr lang="en-US" dirty="0"/>
+                    </a:p>
+                  </a:txBody>
+                  <a:tcPr/>
+                </a:tc>
+                <a:tc>
+                  <a:txBody>
+                    <a:bodyPr/>
+                    <a:lstStyle/>
+                    <a:p>
+                      <a:r>
+                        <a:rPr lang="en-US" dirty="0" smtClean="0"/>
+                        <a:t>equal to</a:t>
+                      </a:r>
+                      <a:endParaRPr lang="en-US" dirty="0"/>
+                    </a:p>
+                  </a:txBody>
+                  <a:tcPr/>
+                </a:tc>
+                <a:tc>
+                  <a:txBody>
+                    <a:bodyPr/>
+                    <a:lstStyle/>
+                    <a:p>
+                      <a:r>
+                        <a:rPr lang="en-US" dirty="0" smtClean="0"/>
+                        <a:t>x</a:t>
+                      </a:r>
+                      <a:r>
+                        <a:rPr lang="en-US" baseline="0" dirty="0" smtClean="0"/>
+                        <a:t> == 10</a:t>
+                      </a:r>
+                      <a:endParaRPr lang="en-US" dirty="0"/>
+                    </a:p>
+                  </a:txBody>
+                  <a:tcPr/>
+                </a:tc>
+                <a:extLst>
+                  <a:ext uri="{0D108BD9-81ED-4DB2-BD59-A6C34878D82A}">
+                    <a16:rowId xmlns:a16="http://schemas.microsoft.com/office/drawing/2014/main" val="3768477849"/>
+                  </a:ext>
+                </a:extLst>
+              </a:tr>
+              <a:tr h="364418">
+                <a:tc>
+                  <a:txBody>
+                    <a:bodyPr/>
+                    <a:lstStyle/>
+                    <a:p>
+                      <a:r>
+                        <a:rPr lang="en-US" dirty="0" smtClean="0"/>
+                        <a:t>===</a:t>
+                      </a:r>
+                      <a:endParaRPr lang="en-US" dirty="0"/>
+                    </a:p>
+                  </a:txBody>
+                  <a:tcPr/>
+                </a:tc>
+                <a:tc>
+                  <a:txBody>
+                    <a:bodyPr/>
+                    <a:lstStyle/>
+                    <a:p>
+                      <a:r>
+                        <a:rPr lang="en-US" dirty="0" smtClean="0"/>
+                        <a:t>equal value and equal type</a:t>
+                      </a:r>
+                      <a:endParaRPr lang="en-US" dirty="0"/>
+                    </a:p>
+                  </a:txBody>
+                  <a:tcPr/>
+                </a:tc>
+                <a:tc>
+                  <a:txBody>
+                    <a:bodyPr/>
+                    <a:lstStyle/>
+                    <a:p>
+                      <a:r>
+                        <a:rPr lang="en-US" dirty="0" smtClean="0"/>
+                        <a:t>x === “10”</a:t>
+                      </a:r>
+                      <a:endParaRPr lang="en-US" dirty="0"/>
+                    </a:p>
+                  </a:txBody>
+                  <a:tcPr/>
+                </a:tc>
+                <a:extLst>
+                  <a:ext uri="{0D108BD9-81ED-4DB2-BD59-A6C34878D82A}">
+                    <a16:rowId xmlns:a16="http://schemas.microsoft.com/office/drawing/2014/main" val="129340161"/>
+                  </a:ext>
+                </a:extLst>
+              </a:tr>
+              <a:tr h="364418">
+                <a:tc>
+                  <a:txBody>
+                    <a:bodyPr/>
+                    <a:lstStyle/>
+                    <a:p>
+                      <a:r>
+                        <a:rPr lang="en-US" dirty="0" smtClean="0"/>
+                        <a:t>!=</a:t>
+                      </a:r>
+                      <a:endParaRPr lang="en-US" dirty="0"/>
+                    </a:p>
+                  </a:txBody>
+                  <a:tcPr/>
+                </a:tc>
+                <a:tc>
+                  <a:txBody>
+                    <a:bodyPr/>
+                    <a:lstStyle/>
+                    <a:p>
+                      <a:r>
+                        <a:rPr lang="en-US" dirty="0" smtClean="0"/>
+                        <a:t>not equal</a:t>
+                      </a:r>
+                      <a:endParaRPr lang="en-US" dirty="0"/>
+                    </a:p>
+                  </a:txBody>
+                  <a:tcPr/>
+                </a:tc>
+                <a:tc>
+                  <a:txBody>
+                    <a:bodyPr/>
+                    <a:lstStyle/>
+                    <a:p>
+                      <a:r>
+                        <a:rPr lang="en-US" dirty="0" smtClean="0"/>
+                        <a:t>x != 10</a:t>
+                      </a:r>
+                      <a:endParaRPr lang="en-US" dirty="0"/>
+                    </a:p>
+                  </a:txBody>
+                  <a:tcPr/>
+                </a:tc>
+                <a:extLst>
+                  <a:ext uri="{0D108BD9-81ED-4DB2-BD59-A6C34878D82A}">
+                    <a16:rowId xmlns:a16="http://schemas.microsoft.com/office/drawing/2014/main" val="3912950251"/>
+                  </a:ext>
+                </a:extLst>
+              </a:tr>
+              <a:tr h="364418">
+                <a:tc>
+                  <a:txBody>
+                    <a:bodyPr/>
+                    <a:lstStyle/>
+                    <a:p>
+                      <a:r>
+                        <a:rPr lang="en-US" dirty="0" smtClean="0"/>
+                        <a:t>!==</a:t>
+                      </a:r>
+                      <a:endParaRPr lang="en-US" dirty="0"/>
+                    </a:p>
+                  </a:txBody>
+                  <a:tcPr/>
+                </a:tc>
+                <a:tc>
+                  <a:txBody>
+                    <a:bodyPr/>
+                    <a:lstStyle/>
+                    <a:p>
+                      <a:r>
+                        <a:rPr lang="en-US" dirty="0" smtClean="0"/>
+                        <a:t>not equal to and not equal type</a:t>
+                      </a:r>
+                      <a:endParaRPr lang="en-US" dirty="0"/>
+                    </a:p>
+                  </a:txBody>
+                  <a:tcPr/>
+                </a:tc>
+                <a:tc>
+                  <a:txBody>
+                    <a:bodyPr/>
+                    <a:lstStyle/>
+                    <a:p>
+                      <a:r>
+                        <a:rPr lang="en-US" dirty="0" smtClean="0"/>
+                        <a:t>x !== “10”</a:t>
+                      </a:r>
+                      <a:endParaRPr lang="en-US" dirty="0"/>
+                    </a:p>
+                  </a:txBody>
+                  <a:tcPr/>
+                </a:tc>
+                <a:extLst>
+                  <a:ext uri="{0D108BD9-81ED-4DB2-BD59-A6C34878D82A}">
+                    <a16:rowId xmlns:a16="http://schemas.microsoft.com/office/drawing/2014/main" val="3095385837"/>
+                  </a:ext>
+                </a:extLst>
+              </a:tr>
+            </a:tbl>
+          </a:graphicData>
+        </a:graphic>
+      </p:graphicFrame>
+      <p:graphicFrame>
+        <p:nvGraphicFramePr>
+          <p:cNvPr id="6" name="Table 5"/>
+          <p:cNvGraphicFramePr>
+            <a:graphicFrameLocks noGrp="1"/>
+          </p:cNvGraphicFramePr>
+          <p:nvPr>
+            <p:extLst>
+              <p:ext uri="{D42A27DB-BD31-4B8C-83A1-F6EECF244321}">
+                <p14:modId xmlns:p14="http://schemas.microsoft.com/office/powerpoint/2010/main" val="209591726"/>
+              </p:ext>
+            </p:extLst>
+          </p:nvPr>
+        </p:nvGraphicFramePr>
+        <p:xfrm>
+          <a:off x="8811491" y="2398987"/>
+          <a:ext cx="2050473" cy="1828800"/>
+        </p:xfrm>
+        <a:graphic>
+          <a:graphicData uri="http://schemas.openxmlformats.org/drawingml/2006/table">
+            <a:tbl>
+              <a:tblPr firstRow="1" bandRow="1">
+                <a:tableStyleId>{F5AB1C69-6EDB-4FF4-983F-18BD219EF322}</a:tableStyleId>
+              </a:tblPr>
+              <a:tblGrid>
+                <a:gridCol w="2050473">
+                  <a:extLst>
+                    <a:ext uri="{9D8B030D-6E8A-4147-A177-3AD203B41FA5}">
+                      <a16:colId xmlns:a16="http://schemas.microsoft.com/office/drawing/2014/main" val="3768001086"/>
+                    </a:ext>
+                  </a:extLst>
+                </a:gridCol>
+              </a:tblGrid>
+              <a:tr h="359426">
+                <a:tc>
+                  <a:txBody>
+                    <a:bodyPr/>
+                    <a:lstStyle/>
+                    <a:p>
+                      <a:r>
+                        <a:rPr lang="en-US" dirty="0" smtClean="0"/>
+                        <a:t>Returns</a:t>
+                      </a:r>
+                      <a:endParaRPr lang="en-US" dirty="0"/>
+                    </a:p>
+                  </a:txBody>
+                  <a:tcPr/>
+                </a:tc>
+                <a:extLst>
+                  <a:ext uri="{0D108BD9-81ED-4DB2-BD59-A6C34878D82A}">
+                    <a16:rowId xmlns:a16="http://schemas.microsoft.com/office/drawing/2014/main" val="1773911138"/>
+                  </a:ext>
+                </a:extLst>
+              </a:tr>
+              <a:tr h="364418">
+                <a:tc>
+                  <a:txBody>
+                    <a:bodyPr/>
+                    <a:lstStyle/>
+                    <a:p>
+                      <a:r>
+                        <a:rPr lang="en-US" dirty="0" smtClean="0"/>
+                        <a:t>true</a:t>
+                      </a:r>
+                      <a:endParaRPr lang="en-US" dirty="0"/>
+                    </a:p>
+                  </a:txBody>
+                  <a:tcPr/>
+                </a:tc>
+                <a:extLst>
+                  <a:ext uri="{0D108BD9-81ED-4DB2-BD59-A6C34878D82A}">
+                    <a16:rowId xmlns:a16="http://schemas.microsoft.com/office/drawing/2014/main" val="4240436716"/>
+                  </a:ext>
+                </a:extLst>
+              </a:tr>
+              <a:tr h="364418">
+                <a:tc>
+                  <a:txBody>
+                    <a:bodyPr/>
+                    <a:lstStyle/>
+                    <a:p>
+                      <a:r>
+                        <a:rPr lang="en-US" dirty="0" smtClean="0"/>
+                        <a:t>false</a:t>
+                      </a:r>
+                      <a:endParaRPr lang="en-US" dirty="0"/>
+                    </a:p>
+                  </a:txBody>
+                  <a:tcPr/>
+                </a:tc>
+                <a:extLst>
+                  <a:ext uri="{0D108BD9-81ED-4DB2-BD59-A6C34878D82A}">
+                    <a16:rowId xmlns:a16="http://schemas.microsoft.com/office/drawing/2014/main" val="3152308193"/>
+                  </a:ext>
+                </a:extLst>
+              </a:tr>
+              <a:tr h="364418">
+                <a:tc>
+                  <a:txBody>
+                    <a:bodyPr/>
+                    <a:lstStyle/>
+                    <a:p>
+                      <a:r>
+                        <a:rPr lang="en-US" dirty="0" smtClean="0"/>
+                        <a:t>false</a:t>
+                      </a:r>
+                      <a:endParaRPr lang="en-US" dirty="0"/>
+                    </a:p>
+                  </a:txBody>
+                  <a:tcPr/>
+                </a:tc>
+                <a:extLst>
+                  <a:ext uri="{0D108BD9-81ED-4DB2-BD59-A6C34878D82A}">
+                    <a16:rowId xmlns:a16="http://schemas.microsoft.com/office/drawing/2014/main" val="842467801"/>
+                  </a:ext>
+                </a:extLst>
+              </a:tr>
+              <a:tr h="364418">
+                <a:tc>
+                  <a:txBody>
+                    <a:bodyPr/>
+                    <a:lstStyle/>
+                    <a:p>
+                      <a:r>
+                        <a:rPr lang="en-US" dirty="0" smtClean="0"/>
+                        <a:t>true</a:t>
+                      </a:r>
+                      <a:endParaRPr lang="en-US" dirty="0"/>
+                    </a:p>
+                  </a:txBody>
+                  <a:tcPr/>
+                </a:tc>
+                <a:extLst>
+                  <a:ext uri="{0D108BD9-81ED-4DB2-BD59-A6C34878D82A}">
+                    <a16:rowId xmlns:a16="http://schemas.microsoft.com/office/drawing/2014/main" val="2699007415"/>
+                  </a:ext>
+                </a:extLst>
+              </a:tr>
+            </a:tbl>
+          </a:graphicData>
+        </a:graphic>
+      </p:graphicFrame>
+      <p:graphicFrame>
+        <p:nvGraphicFramePr>
+          <p:cNvPr id="7" name="Table 6"/>
+          <p:cNvGraphicFramePr>
+            <a:graphicFrameLocks noGrp="1"/>
+          </p:cNvGraphicFramePr>
+          <p:nvPr>
+            <p:extLst>
+              <p:ext uri="{D42A27DB-BD31-4B8C-83A1-F6EECF244321}">
+                <p14:modId xmlns:p14="http://schemas.microsoft.com/office/powerpoint/2010/main" val="972773584"/>
+              </p:ext>
+            </p:extLst>
+          </p:nvPr>
+        </p:nvGraphicFramePr>
+        <p:xfrm>
+          <a:off x="979052" y="4375107"/>
+          <a:ext cx="9882912" cy="2207762"/>
+        </p:xfrm>
+        <a:graphic>
+          <a:graphicData uri="http://schemas.openxmlformats.org/drawingml/2006/table">
+            <a:tbl>
+              <a:tblPr firstRow="1" bandRow="1">
+                <a:tableStyleId>{5C22544A-7EE6-4342-B048-85BDC9FD1C3A}</a:tableStyleId>
+              </a:tblPr>
+              <a:tblGrid>
+                <a:gridCol w="2470728">
+                  <a:extLst>
+                    <a:ext uri="{9D8B030D-6E8A-4147-A177-3AD203B41FA5}">
+                      <a16:colId xmlns:a16="http://schemas.microsoft.com/office/drawing/2014/main" val="2091536462"/>
+                    </a:ext>
+                  </a:extLst>
+                </a:gridCol>
+                <a:gridCol w="2470728">
+                  <a:extLst>
+                    <a:ext uri="{9D8B030D-6E8A-4147-A177-3AD203B41FA5}">
+                      <a16:colId xmlns:a16="http://schemas.microsoft.com/office/drawing/2014/main" val="2112364431"/>
+                    </a:ext>
+                  </a:extLst>
+                </a:gridCol>
+                <a:gridCol w="2470728">
+                  <a:extLst>
+                    <a:ext uri="{9D8B030D-6E8A-4147-A177-3AD203B41FA5}">
+                      <a16:colId xmlns:a16="http://schemas.microsoft.com/office/drawing/2014/main" val="29891174"/>
+                    </a:ext>
+                  </a:extLst>
+                </a:gridCol>
+                <a:gridCol w="2470728">
+                  <a:extLst>
+                    <a:ext uri="{9D8B030D-6E8A-4147-A177-3AD203B41FA5}">
+                      <a16:colId xmlns:a16="http://schemas.microsoft.com/office/drawing/2014/main" val="241476665"/>
+                    </a:ext>
+                  </a:extLst>
+                </a:gridCol>
+              </a:tblGrid>
+              <a:tr h="0">
+                <a:tc>
+                  <a:txBody>
+                    <a:bodyPr/>
+                    <a:lstStyle/>
+                    <a:p>
+                      <a:r>
+                        <a:rPr lang="en-US" dirty="0" smtClean="0"/>
+                        <a:t>Operator</a:t>
+                      </a:r>
+                      <a:endParaRPr lang="en-US" dirty="0"/>
+                    </a:p>
+                  </a:txBody>
+                  <a:tcPr/>
+                </a:tc>
+                <a:tc>
+                  <a:txBody>
+                    <a:bodyPr/>
+                    <a:lstStyle/>
+                    <a:p>
+                      <a:r>
+                        <a:rPr lang="en-US" dirty="0" smtClean="0"/>
+                        <a:t>Description</a:t>
+                      </a:r>
+                      <a:endParaRPr lang="en-US" dirty="0"/>
+                    </a:p>
+                  </a:txBody>
+                  <a:tcPr/>
+                </a:tc>
+                <a:tc>
+                  <a:txBody>
+                    <a:bodyPr/>
+                    <a:lstStyle/>
+                    <a:p>
+                      <a:r>
+                        <a:rPr lang="en-US" dirty="0" smtClean="0"/>
+                        <a:t>Use</a:t>
+                      </a:r>
+                      <a:r>
+                        <a:rPr lang="en-US" baseline="0" dirty="0" smtClean="0"/>
+                        <a:t> Case</a:t>
+                      </a:r>
+                      <a:endParaRPr lang="en-US" dirty="0"/>
+                    </a:p>
+                  </a:txBody>
+                  <a:tcPr/>
+                </a:tc>
+                <a:tc>
+                  <a:txBody>
+                    <a:bodyPr/>
+                    <a:lstStyle/>
+                    <a:p>
+                      <a:r>
+                        <a:rPr lang="en-US" dirty="0" smtClean="0"/>
+                        <a:t>Returns</a:t>
+                      </a:r>
+                      <a:endParaRPr lang="en-US" dirty="0"/>
+                    </a:p>
+                  </a:txBody>
+                  <a:tcPr/>
+                </a:tc>
+                <a:extLst>
+                  <a:ext uri="{0D108BD9-81ED-4DB2-BD59-A6C34878D82A}">
+                    <a16:rowId xmlns:a16="http://schemas.microsoft.com/office/drawing/2014/main" val="3399790741"/>
+                  </a:ext>
+                </a:extLst>
+              </a:tr>
+              <a:tr h="317280">
+                <a:tc>
+                  <a:txBody>
+                    <a:bodyPr/>
+                    <a:lstStyle/>
+                    <a:p>
+                      <a:r>
+                        <a:rPr lang="en-US" dirty="0" smtClean="0"/>
+                        <a:t>&lt;</a:t>
+                      </a:r>
+                      <a:endParaRPr lang="en-US" dirty="0"/>
+                    </a:p>
+                  </a:txBody>
+                  <a:tcPr/>
+                </a:tc>
+                <a:tc>
+                  <a:txBody>
+                    <a:bodyPr/>
+                    <a:lstStyle/>
+                    <a:p>
+                      <a:r>
+                        <a:rPr lang="en-US" dirty="0" smtClean="0"/>
+                        <a:t>Less than</a:t>
+                      </a:r>
+                      <a:endParaRPr lang="en-US" dirty="0"/>
+                    </a:p>
+                  </a:txBody>
+                  <a:tcPr/>
+                </a:tc>
+                <a:tc>
+                  <a:txBody>
+                    <a:bodyPr/>
+                    <a:lstStyle/>
+                    <a:p>
+                      <a:r>
+                        <a:rPr lang="en-US" dirty="0" smtClean="0"/>
+                        <a:t>x</a:t>
+                      </a:r>
+                      <a:r>
+                        <a:rPr lang="en-US" baseline="0" dirty="0" smtClean="0"/>
+                        <a:t> &lt; 10</a:t>
+                      </a:r>
+                      <a:endParaRPr lang="en-US" dirty="0"/>
+                    </a:p>
+                  </a:txBody>
+                  <a:tcPr/>
+                </a:tc>
+                <a:tc>
+                  <a:txBody>
+                    <a:bodyPr/>
+                    <a:lstStyle/>
+                    <a:p>
+                      <a:r>
+                        <a:rPr lang="en-US" dirty="0" smtClean="0"/>
+                        <a:t>false</a:t>
+                      </a:r>
+                      <a:endParaRPr lang="en-US" dirty="0"/>
+                    </a:p>
+                  </a:txBody>
+                  <a:tcPr/>
+                </a:tc>
+                <a:extLst>
+                  <a:ext uri="{0D108BD9-81ED-4DB2-BD59-A6C34878D82A}">
+                    <a16:rowId xmlns:a16="http://schemas.microsoft.com/office/drawing/2014/main" val="539963883"/>
+                  </a:ext>
+                </a:extLst>
+              </a:tr>
+              <a:tr h="555241">
+                <a:tc>
+                  <a:txBody>
+                    <a:bodyPr/>
+                    <a:lstStyle/>
+                    <a:p>
+                      <a:r>
+                        <a:rPr lang="en-US" dirty="0" smtClean="0"/>
+                        <a:t>&lt;=</a:t>
+                      </a:r>
+                      <a:endParaRPr lang="en-US" dirty="0"/>
+                    </a:p>
+                  </a:txBody>
+                  <a:tcPr/>
+                </a:tc>
+                <a:tc>
+                  <a:txBody>
+                    <a:bodyPr/>
+                    <a:lstStyle/>
+                    <a:p>
+                      <a:r>
+                        <a:rPr lang="en-US" dirty="0" smtClean="0"/>
+                        <a:t>Less than or equal</a:t>
+                      </a:r>
+                      <a:endParaRPr lang="en-US" dirty="0"/>
+                    </a:p>
+                  </a:txBody>
+                  <a:tcPr/>
+                </a:tc>
+                <a:tc>
+                  <a:txBody>
+                    <a:bodyPr/>
+                    <a:lstStyle/>
+                    <a:p>
+                      <a:r>
+                        <a:rPr lang="en-US" dirty="0" smtClean="0"/>
+                        <a:t>x &lt;= 10</a:t>
+                      </a:r>
+                      <a:endParaRPr lang="en-US" dirty="0"/>
+                    </a:p>
+                  </a:txBody>
+                  <a:tcPr/>
+                </a:tc>
+                <a:tc>
+                  <a:txBody>
+                    <a:bodyPr/>
+                    <a:lstStyle/>
+                    <a:p>
+                      <a:r>
+                        <a:rPr lang="en-US" dirty="0" smtClean="0"/>
+                        <a:t>true</a:t>
+                      </a:r>
+                      <a:endParaRPr lang="en-US" dirty="0"/>
+                    </a:p>
+                  </a:txBody>
+                  <a:tcPr/>
+                </a:tc>
+                <a:extLst>
+                  <a:ext uri="{0D108BD9-81ED-4DB2-BD59-A6C34878D82A}">
+                    <a16:rowId xmlns:a16="http://schemas.microsoft.com/office/drawing/2014/main" val="2012912663"/>
+                  </a:ext>
+                </a:extLst>
+              </a:tr>
+              <a:tr h="317280">
+                <a:tc>
+                  <a:txBody>
+                    <a:bodyPr/>
+                    <a:lstStyle/>
+                    <a:p>
+                      <a:r>
+                        <a:rPr lang="en-US" dirty="0" smtClean="0"/>
+                        <a:t>&gt;</a:t>
+                      </a:r>
+                      <a:endParaRPr lang="en-US" dirty="0"/>
+                    </a:p>
+                  </a:txBody>
+                  <a:tcPr/>
+                </a:tc>
+                <a:tc>
+                  <a:txBody>
+                    <a:bodyPr/>
+                    <a:lstStyle/>
+                    <a:p>
+                      <a:r>
+                        <a:rPr lang="en-US" dirty="0" smtClean="0"/>
+                        <a:t>Greater than</a:t>
+                      </a:r>
+                      <a:endParaRPr lang="en-US" dirty="0"/>
+                    </a:p>
+                  </a:txBody>
+                  <a:tcPr/>
+                </a:tc>
+                <a:tc>
+                  <a:txBody>
+                    <a:bodyPr/>
+                    <a:lstStyle/>
+                    <a:p>
+                      <a:r>
+                        <a:rPr lang="en-US" dirty="0" smtClean="0"/>
+                        <a:t>x &gt; 10</a:t>
+                      </a:r>
+                      <a:endParaRPr lang="en-US" dirty="0"/>
+                    </a:p>
+                  </a:txBody>
+                  <a:tcPr/>
+                </a:tc>
+                <a:tc>
+                  <a:txBody>
+                    <a:bodyPr/>
+                    <a:lstStyle/>
+                    <a:p>
+                      <a:r>
+                        <a:rPr lang="en-US" dirty="0" smtClean="0"/>
+                        <a:t>false</a:t>
+                      </a:r>
+                      <a:endParaRPr lang="en-US" dirty="0"/>
+                    </a:p>
+                  </a:txBody>
+                  <a:tcPr/>
+                </a:tc>
+                <a:extLst>
+                  <a:ext uri="{0D108BD9-81ED-4DB2-BD59-A6C34878D82A}">
+                    <a16:rowId xmlns:a16="http://schemas.microsoft.com/office/drawing/2014/main" val="650467539"/>
+                  </a:ext>
+                </a:extLst>
+              </a:tr>
+              <a:tr h="555241">
+                <a:tc>
+                  <a:txBody>
+                    <a:bodyPr/>
+                    <a:lstStyle/>
+                    <a:p>
+                      <a:r>
+                        <a:rPr lang="en-US" dirty="0" smtClean="0"/>
+                        <a:t>&gt;=</a:t>
+                      </a:r>
+                      <a:endParaRPr lang="en-US" dirty="0"/>
+                    </a:p>
+                  </a:txBody>
+                  <a:tcPr/>
+                </a:tc>
+                <a:tc>
+                  <a:txBody>
+                    <a:bodyPr/>
+                    <a:lstStyle/>
+                    <a:p>
+                      <a:r>
+                        <a:rPr lang="en-US" dirty="0" smtClean="0"/>
+                        <a:t>Greater than or equal</a:t>
+                      </a:r>
+                      <a:endParaRPr lang="en-US" dirty="0"/>
+                    </a:p>
+                  </a:txBody>
+                  <a:tcPr/>
+                </a:tc>
+                <a:tc>
+                  <a:txBody>
+                    <a:bodyPr/>
+                    <a:lstStyle/>
+                    <a:p>
+                      <a:r>
+                        <a:rPr lang="en-US" dirty="0" smtClean="0"/>
+                        <a:t>x &gt;= 10</a:t>
+                      </a:r>
+                      <a:endParaRPr lang="en-US" dirty="0"/>
+                    </a:p>
+                  </a:txBody>
+                  <a:tcPr/>
+                </a:tc>
+                <a:tc>
+                  <a:txBody>
+                    <a:bodyPr/>
+                    <a:lstStyle/>
+                    <a:p>
+                      <a:r>
+                        <a:rPr lang="en-US" dirty="0" smtClean="0"/>
+                        <a:t>true</a:t>
+                      </a:r>
+                      <a:endParaRPr lang="en-US" dirty="0"/>
+                    </a:p>
+                  </a:txBody>
+                  <a:tcPr/>
+                </a:tc>
+                <a:extLst>
+                  <a:ext uri="{0D108BD9-81ED-4DB2-BD59-A6C34878D82A}">
+                    <a16:rowId xmlns:a16="http://schemas.microsoft.com/office/drawing/2014/main" val="807040273"/>
+                  </a:ext>
+                </a:extLst>
+              </a:tr>
+            </a:tbl>
+          </a:graphicData>
+        </a:graphic>
+      </p:graphicFrame>
+    </p:spTree>
+    <p:extLst>
+      <p:ext uri="{BB962C8B-B14F-4D97-AF65-F5344CB8AC3E}">
+        <p14:creationId xmlns:p14="http://schemas.microsoft.com/office/powerpoint/2010/main" val="1124037420"/>
+      </p:ext>
+    </p:extLst>
+  </p:cSld>
+  <p:clrMapOvr>
+    <a:masterClrMapping/>
+  </p:clrMapOvr>
+</p:sld>
+</file>
+
 <file path=ppt/slides/slide2.xml><?xml version="1.0" encoding="utf-8"?>
 <p:sld xmlns:a="http://schemas.openxmlformats.org/drawingml/2006/main" xmlns:r="http://schemas.openxmlformats.org/officeDocument/2006/relationships" xmlns:p="http://schemas.openxmlformats.org/presentationml/2006/main">
   <p:cSld>
@@ -5265,6 +6236,400 @@
     <p:extLst>
       <p:ext uri="{BB962C8B-B14F-4D97-AF65-F5344CB8AC3E}">
         <p14:creationId xmlns:p14="http://schemas.microsoft.com/office/powerpoint/2010/main" val="935442073"/>
+      </p:ext>
+    </p:extLst>
+  </p:cSld>
+  <p:clrMapOvr>
+    <a:masterClrMapping/>
+  </p:clrMapOvr>
+</p:sld>
+</file>
+
+<file path=ppt/slides/slide20.xml><?xml version="1.0" encoding="utf-8"?>
+<p:sld xmlns:a="http://schemas.openxmlformats.org/drawingml/2006/main" xmlns:r="http://schemas.openxmlformats.org/officeDocument/2006/relationships" xmlns:p="http://schemas.openxmlformats.org/presentationml/2006/main">
+  <p:cSld>
+    <p:spTree>
+      <p:nvGrpSpPr>
+        <p:cNvPr id="1" name=""/>
+        <p:cNvGrpSpPr/>
+        <p:nvPr/>
+      </p:nvGrpSpPr>
+      <p:grpSpPr>
+        <a:xfrm>
+          <a:off x="0" y="0"/>
+          <a:ext cx="0" cy="0"/>
+          <a:chOff x="0" y="0"/>
+          <a:chExt cx="0" cy="0"/>
+        </a:xfrm>
+      </p:grpSpPr>
+      <p:sp>
+        <p:nvSpPr>
+          <p:cNvPr id="3" name="Content Placeholder 2"/>
+          <p:cNvSpPr>
+            <a:spLocks noGrp="1"/>
+          </p:cNvSpPr>
+          <p:nvPr>
+            <p:ph idx="1"/>
+          </p:nvPr>
+        </p:nvSpPr>
+        <p:spPr>
+          <a:xfrm>
+            <a:off x="838200" y="290945"/>
+            <a:ext cx="10515600" cy="6289964"/>
+          </a:xfrm>
+        </p:spPr>
+        <p:txBody>
+          <a:bodyPr>
+            <a:normAutofit fontScale="55000" lnSpcReduction="20000"/>
+          </a:bodyPr>
+          <a:lstStyle/>
+          <a:p>
+            <a:pPr marL="0" indent="0">
+              <a:buNone/>
+            </a:pPr>
+            <a:r>
+              <a:rPr lang="en-US" b="1" dirty="0" smtClean="0"/>
+              <a:t>Conditional Statements (if, else, else if)</a:t>
+            </a:r>
+          </a:p>
+          <a:p>
+            <a:pPr marL="0" indent="0">
+              <a:buNone/>
+            </a:pPr>
+            <a:r>
+              <a:rPr lang="en-US" sz="3200" dirty="0" smtClean="0"/>
+              <a:t>These are used to execute a block of code if it satisfies a condition</a:t>
+            </a:r>
+          </a:p>
+          <a:p>
+            <a:pPr marL="0" indent="0">
+              <a:buNone/>
+            </a:pPr>
+            <a:r>
+              <a:rPr lang="en-US" sz="3200" i="1" dirty="0">
+                <a:solidFill>
+                  <a:schemeClr val="accent2">
+                    <a:lumMod val="75000"/>
+                  </a:schemeClr>
+                </a:solidFill>
+              </a:rPr>
+              <a:t>if (condition) {</a:t>
+            </a:r>
+            <a:br>
+              <a:rPr lang="en-US" sz="3200" i="1" dirty="0">
+                <a:solidFill>
+                  <a:schemeClr val="accent2">
+                    <a:lumMod val="75000"/>
+                  </a:schemeClr>
+                </a:solidFill>
+              </a:rPr>
+            </a:br>
+            <a:r>
+              <a:rPr lang="en-US" sz="3200" i="1" dirty="0">
+                <a:solidFill>
+                  <a:schemeClr val="accent2">
+                    <a:lumMod val="75000"/>
+                  </a:schemeClr>
+                </a:solidFill>
+              </a:rPr>
+              <a:t>  //  block of code to be executed if the condition is true</a:t>
+            </a:r>
+            <a:br>
+              <a:rPr lang="en-US" sz="3200" i="1" dirty="0">
+                <a:solidFill>
+                  <a:schemeClr val="accent2">
+                    <a:lumMod val="75000"/>
+                  </a:schemeClr>
+                </a:solidFill>
+              </a:rPr>
+            </a:br>
+            <a:r>
+              <a:rPr lang="en-US" sz="3200" i="1" dirty="0" smtClean="0">
+                <a:solidFill>
+                  <a:schemeClr val="accent2">
+                    <a:lumMod val="75000"/>
+                  </a:schemeClr>
+                </a:solidFill>
+              </a:rPr>
+              <a:t>}</a:t>
+            </a:r>
+            <a:endParaRPr lang="en-US" sz="3200" i="1" dirty="0">
+              <a:solidFill>
+                <a:schemeClr val="accent2">
+                  <a:lumMod val="75000"/>
+                </a:schemeClr>
+              </a:solidFill>
+            </a:endParaRPr>
+          </a:p>
+          <a:p>
+            <a:pPr marL="0" indent="0">
+              <a:buNone/>
+            </a:pPr>
+            <a:endParaRPr lang="en-US" sz="3200" b="1" dirty="0" smtClean="0"/>
+          </a:p>
+          <a:p>
+            <a:pPr marL="0" indent="0">
+              <a:buNone/>
+            </a:pPr>
+            <a:r>
+              <a:rPr lang="en-US" sz="3200" i="1" dirty="0">
+                <a:solidFill>
+                  <a:schemeClr val="accent6"/>
+                </a:solidFill>
+              </a:rPr>
+              <a:t>if (condition) {</a:t>
+            </a:r>
+            <a:br>
+              <a:rPr lang="en-US" sz="3200" i="1" dirty="0">
+                <a:solidFill>
+                  <a:schemeClr val="accent6"/>
+                </a:solidFill>
+              </a:rPr>
+            </a:br>
+            <a:r>
+              <a:rPr lang="en-US" sz="3200" i="1" dirty="0">
+                <a:solidFill>
+                  <a:schemeClr val="accent6"/>
+                </a:solidFill>
+              </a:rPr>
+              <a:t>  //  block of code to be executed if the condition is true</a:t>
+            </a:r>
+            <a:br>
+              <a:rPr lang="en-US" sz="3200" i="1" dirty="0">
+                <a:solidFill>
+                  <a:schemeClr val="accent6"/>
+                </a:solidFill>
+              </a:rPr>
+            </a:br>
+            <a:r>
+              <a:rPr lang="en-US" sz="3200" i="1" dirty="0" smtClean="0">
+                <a:solidFill>
+                  <a:schemeClr val="accent6"/>
+                </a:solidFill>
+              </a:rPr>
+              <a:t>}</a:t>
+            </a:r>
+          </a:p>
+          <a:p>
+            <a:pPr marL="0" indent="0">
+              <a:buNone/>
+            </a:pPr>
+            <a:r>
+              <a:rPr lang="en-US" sz="3200" i="1" dirty="0">
+                <a:solidFill>
+                  <a:schemeClr val="accent6"/>
+                </a:solidFill>
+              </a:rPr>
+              <a:t>e</a:t>
+            </a:r>
+            <a:r>
+              <a:rPr lang="en-US" sz="3200" i="1" dirty="0" smtClean="0">
+                <a:solidFill>
+                  <a:schemeClr val="accent6"/>
+                </a:solidFill>
+              </a:rPr>
+              <a:t>lse{</a:t>
+            </a:r>
+          </a:p>
+          <a:p>
+            <a:pPr marL="0" indent="0">
+              <a:buNone/>
+            </a:pPr>
+            <a:r>
+              <a:rPr lang="en-US" sz="3200" i="1" dirty="0">
+                <a:solidFill>
+                  <a:schemeClr val="accent6"/>
+                </a:solidFill>
+              </a:rPr>
+              <a:t>//  block of code to be executed if the condition is true</a:t>
+            </a:r>
+            <a:endParaRPr lang="en-US" sz="3200" i="1" dirty="0" smtClean="0">
+              <a:solidFill>
+                <a:schemeClr val="accent6"/>
+              </a:solidFill>
+            </a:endParaRPr>
+          </a:p>
+          <a:p>
+            <a:pPr marL="0" indent="0">
+              <a:buNone/>
+            </a:pPr>
+            <a:r>
+              <a:rPr lang="en-US" sz="3200" i="1" dirty="0" smtClean="0">
+                <a:solidFill>
+                  <a:schemeClr val="accent6"/>
+                </a:solidFill>
+              </a:rPr>
+              <a:t>}</a:t>
+            </a:r>
+          </a:p>
+          <a:p>
+            <a:pPr marL="0" indent="0">
+              <a:buNone/>
+            </a:pPr>
+            <a:endParaRPr lang="en-US" sz="3200" i="1" dirty="0">
+              <a:solidFill>
+                <a:schemeClr val="accent6"/>
+              </a:solidFill>
+            </a:endParaRPr>
+          </a:p>
+          <a:p>
+            <a:pPr marL="0" indent="0">
+              <a:buNone/>
+            </a:pPr>
+            <a:r>
+              <a:rPr lang="en-US" sz="3200" i="1" dirty="0">
+                <a:solidFill>
+                  <a:srgbClr val="0070C0"/>
+                </a:solidFill>
+              </a:rPr>
+              <a:t>if (condition) {</a:t>
+            </a:r>
+            <a:br>
+              <a:rPr lang="en-US" sz="3200" i="1" dirty="0">
+                <a:solidFill>
+                  <a:srgbClr val="0070C0"/>
+                </a:solidFill>
+              </a:rPr>
+            </a:br>
+            <a:r>
+              <a:rPr lang="en-US" sz="3200" i="1" dirty="0">
+                <a:solidFill>
+                  <a:srgbClr val="0070C0"/>
+                </a:solidFill>
+              </a:rPr>
+              <a:t>  //  block of code to be executed if the condition is true</a:t>
+            </a:r>
+            <a:br>
+              <a:rPr lang="en-US" sz="3200" i="1" dirty="0">
+                <a:solidFill>
+                  <a:srgbClr val="0070C0"/>
+                </a:solidFill>
+              </a:rPr>
+            </a:br>
+            <a:r>
+              <a:rPr lang="en-US" sz="3200" i="1" dirty="0" smtClean="0">
+                <a:solidFill>
+                  <a:srgbClr val="0070C0"/>
+                </a:solidFill>
+              </a:rPr>
+              <a:t>}</a:t>
+            </a:r>
+          </a:p>
+          <a:p>
+            <a:pPr marL="0" indent="0">
+              <a:buNone/>
+            </a:pPr>
+            <a:r>
+              <a:rPr lang="en-US" sz="3200" i="1" dirty="0">
+                <a:solidFill>
+                  <a:srgbClr val="0070C0"/>
+                </a:solidFill>
+              </a:rPr>
+              <a:t>e</a:t>
+            </a:r>
+            <a:r>
+              <a:rPr lang="en-US" sz="3200" i="1" dirty="0" smtClean="0">
+                <a:solidFill>
+                  <a:srgbClr val="0070C0"/>
+                </a:solidFill>
+              </a:rPr>
+              <a:t>lse if (condition){</a:t>
+            </a:r>
+          </a:p>
+          <a:p>
+            <a:pPr marL="0" indent="0">
+              <a:buNone/>
+            </a:pPr>
+            <a:r>
+              <a:rPr lang="en-US" sz="3200" i="1" dirty="0">
+                <a:solidFill>
+                  <a:srgbClr val="0070C0"/>
+                </a:solidFill>
+              </a:rPr>
+              <a:t>//  block of code to be executed if the condition is true</a:t>
+            </a:r>
+            <a:endParaRPr lang="en-US" sz="3200" i="1" dirty="0" smtClean="0">
+              <a:solidFill>
+                <a:srgbClr val="0070C0"/>
+              </a:solidFill>
+            </a:endParaRPr>
+          </a:p>
+          <a:p>
+            <a:pPr marL="0" indent="0">
+              <a:buNone/>
+            </a:pPr>
+            <a:r>
+              <a:rPr lang="en-US" sz="3200" i="1" dirty="0">
+                <a:solidFill>
+                  <a:srgbClr val="0070C0"/>
+                </a:solidFill>
+              </a:rPr>
+              <a:t>}</a:t>
+            </a:r>
+          </a:p>
+          <a:p>
+            <a:pPr marL="0" indent="0">
+              <a:buNone/>
+            </a:pPr>
+            <a:r>
+              <a:rPr lang="en-US" sz="3200" i="1" dirty="0">
+                <a:solidFill>
+                  <a:srgbClr val="0070C0"/>
+                </a:solidFill>
+              </a:rPr>
+              <a:t>else{</a:t>
+            </a:r>
+          </a:p>
+          <a:p>
+            <a:pPr marL="0" indent="0">
+              <a:buNone/>
+            </a:pPr>
+            <a:r>
+              <a:rPr lang="en-US" sz="3200" i="1" dirty="0">
+                <a:solidFill>
+                  <a:srgbClr val="0070C0"/>
+                </a:solidFill>
+              </a:rPr>
+              <a:t>//  block of code to be executed if the condition is true</a:t>
+            </a:r>
+          </a:p>
+          <a:p>
+            <a:pPr marL="0" indent="0">
+              <a:buNone/>
+            </a:pPr>
+            <a:r>
+              <a:rPr lang="en-US" sz="3200" i="1" dirty="0">
+                <a:solidFill>
+                  <a:srgbClr val="0070C0"/>
+                </a:solidFill>
+              </a:rPr>
+              <a:t>}</a:t>
+            </a:r>
+          </a:p>
+          <a:p>
+            <a:pPr marL="0" indent="0">
+              <a:buNone/>
+            </a:pPr>
+            <a:endParaRPr lang="en-US" b="1" dirty="0" smtClean="0"/>
+          </a:p>
+          <a:p>
+            <a:pPr marL="0" indent="0">
+              <a:buNone/>
+            </a:pPr>
+            <a:endParaRPr lang="en-US" b="1" dirty="0">
+              <a:solidFill>
+                <a:schemeClr val="bg2">
+                  <a:lumMod val="10000"/>
+                </a:schemeClr>
+              </a:solidFill>
+            </a:endParaRPr>
+          </a:p>
+        </p:txBody>
+      </p:sp>
+    </p:spTree>
+    <p:extLst>
+      <p:ext uri="{BB962C8B-B14F-4D97-AF65-F5344CB8AC3E}">
+        <p14:creationId xmlns:p14="http://schemas.microsoft.com/office/powerpoint/2010/main" val="4106464534"/>
       </p:ext>
     </p:extLst>
   </p:cSld>

</xml_diff>